<commit_message>
last updates to background tasks
</commit_message>
<xml_diff>
--- a/2021-04-01-TwinCitiesDotNetUserGroup-TheBackgroundOnBackgroundTasksInDotNetCore/The Background on Background Tasks.pptx
+++ b/2021-04-01-TwinCitiesDotNetUserGroup-TheBackgroundOnBackgroundTasksInDotNetCore/The Background on Background Tasks.pptx
@@ -237,7 +237,7 @@
           <a:p>
             <a:fld id="{8EBF47D1-607F-45EE-AE63-C10CF3AC8DD9}" type="datetimeFigureOut">
               <a:rPr lang="en-US" smtClean="0"/>
-              <a:t>3/31/2021</a:t>
+              <a:t>4/1/2021</a:t>
             </a:fld>
             <a:endParaRPr lang="en-US"/>
           </a:p>
@@ -4603,7 +4603,7 @@
           <a:p>
             <a:fld id="{A4BF2526-C75C-47BE-928B-0135A92A66BE}" type="datetimeFigureOut">
               <a:rPr lang="en-US" smtClean="0"/>
-              <a:t>3/31/2021</a:t>
+              <a:t>4/1/2021</a:t>
             </a:fld>
             <a:endParaRPr lang="en-US"/>
           </a:p>
@@ -4801,7 +4801,7 @@
           <a:p>
             <a:fld id="{A4BF2526-C75C-47BE-928B-0135A92A66BE}" type="datetimeFigureOut">
               <a:rPr lang="en-US" smtClean="0"/>
-              <a:t>3/31/2021</a:t>
+              <a:t>4/1/2021</a:t>
             </a:fld>
             <a:endParaRPr lang="en-US"/>
           </a:p>
@@ -5009,7 +5009,7 @@
           <a:p>
             <a:fld id="{A4BF2526-C75C-47BE-928B-0135A92A66BE}" type="datetimeFigureOut">
               <a:rPr lang="en-US" smtClean="0"/>
-              <a:t>3/31/2021</a:t>
+              <a:t>4/1/2021</a:t>
             </a:fld>
             <a:endParaRPr lang="en-US"/>
           </a:p>
@@ -5207,7 +5207,7 @@
           <a:p>
             <a:fld id="{A4BF2526-C75C-47BE-928B-0135A92A66BE}" type="datetimeFigureOut">
               <a:rPr lang="en-US" smtClean="0"/>
-              <a:t>3/31/2021</a:t>
+              <a:t>4/1/2021</a:t>
             </a:fld>
             <a:endParaRPr lang="en-US"/>
           </a:p>
@@ -5482,7 +5482,7 @@
           <a:p>
             <a:fld id="{A4BF2526-C75C-47BE-928B-0135A92A66BE}" type="datetimeFigureOut">
               <a:rPr lang="en-US" smtClean="0"/>
-              <a:t>3/31/2021</a:t>
+              <a:t>4/1/2021</a:t>
             </a:fld>
             <a:endParaRPr lang="en-US"/>
           </a:p>
@@ -5747,7 +5747,7 @@
           <a:p>
             <a:fld id="{A4BF2526-C75C-47BE-928B-0135A92A66BE}" type="datetimeFigureOut">
               <a:rPr lang="en-US" smtClean="0"/>
-              <a:t>3/31/2021</a:t>
+              <a:t>4/1/2021</a:t>
             </a:fld>
             <a:endParaRPr lang="en-US"/>
           </a:p>
@@ -6159,7 +6159,7 @@
           <a:p>
             <a:fld id="{A4BF2526-C75C-47BE-928B-0135A92A66BE}" type="datetimeFigureOut">
               <a:rPr lang="en-US" smtClean="0"/>
-              <a:t>3/31/2021</a:t>
+              <a:t>4/1/2021</a:t>
             </a:fld>
             <a:endParaRPr lang="en-US"/>
           </a:p>
@@ -6300,7 +6300,7 @@
           <a:p>
             <a:fld id="{A4BF2526-C75C-47BE-928B-0135A92A66BE}" type="datetimeFigureOut">
               <a:rPr lang="en-US" smtClean="0"/>
-              <a:t>3/31/2021</a:t>
+              <a:t>4/1/2021</a:t>
             </a:fld>
             <a:endParaRPr lang="en-US"/>
           </a:p>
@@ -6413,7 +6413,7 @@
           <a:p>
             <a:fld id="{A4BF2526-C75C-47BE-928B-0135A92A66BE}" type="datetimeFigureOut">
               <a:rPr lang="en-US" smtClean="0"/>
-              <a:t>3/31/2021</a:t>
+              <a:t>4/1/2021</a:t>
             </a:fld>
             <a:endParaRPr lang="en-US"/>
           </a:p>
@@ -6724,7 +6724,7 @@
           <a:p>
             <a:fld id="{A4BF2526-C75C-47BE-928B-0135A92A66BE}" type="datetimeFigureOut">
               <a:rPr lang="en-US" smtClean="0"/>
-              <a:t>3/31/2021</a:t>
+              <a:t>4/1/2021</a:t>
             </a:fld>
             <a:endParaRPr lang="en-US"/>
           </a:p>
@@ -7012,7 +7012,7 @@
           <a:p>
             <a:fld id="{A4BF2526-C75C-47BE-928B-0135A92A66BE}" type="datetimeFigureOut">
               <a:rPr lang="en-US" smtClean="0"/>
-              <a:t>3/31/2021</a:t>
+              <a:t>4/1/2021</a:t>
             </a:fld>
             <a:endParaRPr lang="en-US"/>
           </a:p>
@@ -7253,7 +7253,7 @@
           <a:p>
             <a:fld id="{A4BF2526-C75C-47BE-928B-0135A92A66BE}" type="datetimeFigureOut">
               <a:rPr lang="en-US" smtClean="0"/>
-              <a:t>3/31/2021</a:t>
+              <a:t>4/1/2021</a:t>
             </a:fld>
             <a:endParaRPr lang="en-US"/>
           </a:p>
@@ -26869,10 +26869,9 @@
           </a:p>
           <a:p>
             <a:r>
-              <a:rPr lang="en-US"/>
+              <a:rPr lang="en-US" dirty="0"/>
               <a:t>This slide deck</a:t>
             </a:r>
-            <a:endParaRPr lang="en-US" dirty="0"/>
           </a:p>
         </p:txBody>
       </p:sp>

</xml_diff>